<commit_message>
Update slides and include PDF format
</commit_message>
<xml_diff>
--- a/slides/Intro to Terraform.pptx
+++ b/slides/Intro to Terraform.pptx
@@ -5,7 +5,7 @@
     <p:sldMasterId id="2147483888" r:id="rId1"/>
   </p:sldMasterIdLst>
   <p:notesMasterIdLst>
-    <p:notesMasterId r:id="rId14"/>
+    <p:notesMasterId r:id="rId20"/>
   </p:notesMasterIdLst>
   <p:sldIdLst>
     <p:sldId id="256" r:id="rId2"/>
@@ -14,12 +14,18 @@
     <p:sldId id="260" r:id="rId5"/>
     <p:sldId id="261" r:id="rId6"/>
     <p:sldId id="275" r:id="rId7"/>
-    <p:sldId id="280" r:id="rId8"/>
-    <p:sldId id="281" r:id="rId9"/>
-    <p:sldId id="282" r:id="rId10"/>
-    <p:sldId id="283" r:id="rId11"/>
-    <p:sldId id="284" r:id="rId12"/>
-    <p:sldId id="279" r:id="rId13"/>
+    <p:sldId id="285" r:id="rId8"/>
+    <p:sldId id="286" r:id="rId9"/>
+    <p:sldId id="287" r:id="rId10"/>
+    <p:sldId id="280" r:id="rId11"/>
+    <p:sldId id="288" r:id="rId12"/>
+    <p:sldId id="281" r:id="rId13"/>
+    <p:sldId id="289" r:id="rId14"/>
+    <p:sldId id="282" r:id="rId15"/>
+    <p:sldId id="290" r:id="rId16"/>
+    <p:sldId id="283" r:id="rId17"/>
+    <p:sldId id="284" r:id="rId18"/>
+    <p:sldId id="279" r:id="rId19"/>
   </p:sldIdLst>
   <p:sldSz cx="12192000" cy="6858000"/>
   <p:notesSz cx="6858000" cy="9144000"/>
@@ -208,7 +214,7 @@
           <a:p>
             <a:fld id="{7AA8FC09-CFDB-FD49-AC76-D66AA393508A}" type="datetimeFigureOut">
               <a:rPr lang="en-US" smtClean="0"/>
-              <a:t>5/28/19</a:t>
+              <a:t>5/30/19</a:t>
             </a:fld>
             <a:endParaRPr lang="en-US"/>
           </a:p>
@@ -708,7 +714,7 @@
           <a:p>
             <a:fld id="{5041F8AA-A72C-E74F-8339-5D7239C992A7}" type="slidenum">
               <a:rPr lang="en-US" smtClean="0"/>
-              <a:t>12</a:t>
+              <a:t>18</a:t>
             </a:fld>
             <a:endParaRPr lang="en-US"/>
           </a:p>
@@ -895,7 +901,7 @@
           <a:p>
             <a:fld id="{5A77A5CC-0079-CA47-ACA8-1017B8EDA23F}" type="datetime1">
               <a:rPr lang="en-CA" smtClean="0"/>
-              <a:t>2019-05-28</a:t>
+              <a:t>2019-05-30</a:t>
             </a:fld>
             <a:endParaRPr lang="en-US" dirty="0"/>
           </a:p>
@@ -1123,7 +1129,7 @@
           <a:p>
             <a:fld id="{87854555-4738-DF4E-8997-3BDF0A0F4B4A}" type="datetime1">
               <a:rPr lang="en-CA" smtClean="0"/>
-              <a:t>2019-05-28</a:t>
+              <a:t>2019-05-30</a:t>
             </a:fld>
             <a:endParaRPr lang="en-US" dirty="0"/>
           </a:p>
@@ -1303,7 +1309,7 @@
           <a:p>
             <a:fld id="{A957C6BF-78D8-1143-B615-67ECDA647D4A}" type="datetime1">
               <a:rPr lang="en-CA" smtClean="0"/>
-              <a:t>2019-05-28</a:t>
+              <a:t>2019-05-30</a:t>
             </a:fld>
             <a:endParaRPr lang="en-US" dirty="0"/>
           </a:p>
@@ -1473,7 +1479,7 @@
           <a:p>
             <a:fld id="{D684C333-5DF3-7545-99A6-94B1D909AC87}" type="datetime1">
               <a:rPr lang="en-CA" smtClean="0"/>
-              <a:t>2019-05-28</a:t>
+              <a:t>2019-05-30</a:t>
             </a:fld>
             <a:endParaRPr lang="en-US" dirty="0"/>
           </a:p>
@@ -1735,7 +1741,7 @@
           <a:p>
             <a:fld id="{858EBA4A-857E-5540-95A8-F52A4C9349BB}" type="datetime1">
               <a:rPr lang="en-CA" smtClean="0"/>
-              <a:t>2019-05-28</a:t>
+              <a:t>2019-05-30</a:t>
             </a:fld>
             <a:endParaRPr lang="en-US" dirty="0"/>
           </a:p>
@@ -2061,7 +2067,7 @@
           <a:p>
             <a:fld id="{706407D1-187C-F640-B6D6-744B8CBA075D}" type="datetime1">
               <a:rPr lang="en-CA" smtClean="0"/>
-              <a:t>2019-05-28</a:t>
+              <a:t>2019-05-30</a:t>
             </a:fld>
             <a:endParaRPr lang="en-US" dirty="0"/>
           </a:p>
@@ -2512,7 +2518,7 @@
           <a:p>
             <a:fld id="{05934641-01BF-8241-A0D3-CC53E4D0DF44}" type="datetime1">
               <a:rPr lang="en-CA" smtClean="0"/>
-              <a:t>2019-05-28</a:t>
+              <a:t>2019-05-30</a:t>
             </a:fld>
             <a:endParaRPr lang="en-US" dirty="0"/>
           </a:p>
@@ -2630,7 +2636,7 @@
           <a:p>
             <a:fld id="{18BC1FA0-592E-224E-A248-BAD553B9093F}" type="datetime1">
               <a:rPr lang="en-CA" smtClean="0"/>
-              <a:t>2019-05-28</a:t>
+              <a:t>2019-05-30</a:t>
             </a:fld>
             <a:endParaRPr lang="en-US" dirty="0"/>
           </a:p>
@@ -2725,7 +2731,7 @@
           <a:p>
             <a:fld id="{918BBE81-2E50-E647-BBA3-A39B865B4349}" type="datetime1">
               <a:rPr lang="en-CA" smtClean="0"/>
-              <a:t>2019-05-28</a:t>
+              <a:t>2019-05-30</a:t>
             </a:fld>
             <a:endParaRPr lang="en-US" dirty="0"/>
           </a:p>
@@ -3012,7 +3018,7 @@
           <a:p>
             <a:fld id="{D899C770-4A09-8E43-9904-3202E34AC2D8}" type="datetime1">
               <a:rPr lang="en-CA" smtClean="0"/>
-              <a:t>2019-05-28</a:t>
+              <a:t>2019-05-30</a:t>
             </a:fld>
             <a:endParaRPr lang="en-US" dirty="0"/>
           </a:p>
@@ -3334,7 +3340,7 @@
           <a:p>
             <a:fld id="{078D1F48-6E46-7C43-9398-376F9A3F9088}" type="datetime1">
               <a:rPr lang="en-CA" smtClean="0"/>
-              <a:t>2019-05-28</a:t>
+              <a:t>2019-05-30</a:t>
             </a:fld>
             <a:endParaRPr lang="en-US" dirty="0"/>
           </a:p>
@@ -3588,7 +3594,7 @@
           <a:p>
             <a:fld id="{5D50CA79-7FDE-F049-BD40-2A4EF6A4B73A}" type="datetime1">
               <a:rPr lang="en-CA" smtClean="0"/>
-              <a:t>2019-05-28</a:t>
+              <a:t>2019-05-30</a:t>
             </a:fld>
             <a:endParaRPr lang="en-US" dirty="0"/>
           </a:p>
@@ -4244,6 +4250,576 @@
       </p:grpSpPr>
       <p:sp>
         <p:nvSpPr>
+          <p:cNvPr id="3" name="Footer Placeholder 2">
+            <a:extLst>
+              <a:ext uri="{FF2B5EF4-FFF2-40B4-BE49-F238E27FC236}">
+                <a16:creationId xmlns:a16="http://schemas.microsoft.com/office/drawing/2014/main" id="{879FFCEB-AB73-A544-960D-0FB6B310C87A}"/>
+              </a:ext>
+            </a:extLst>
+          </p:cNvPr>
+          <p:cNvSpPr>
+            <a:spLocks noGrp="1"/>
+          </p:cNvSpPr>
+          <p:nvPr>
+            <p:ph type="ftr" sz="quarter" idx="11"/>
+          </p:nvPr>
+        </p:nvSpPr>
+        <p:spPr/>
+        <p:txBody>
+          <a:bodyPr/>
+          <a:lstStyle/>
+          <a:p>
+            <a:r>
+              <a:rPr lang="en-US"/>
+              <a:t>@redmind</a:t>
+            </a:r>
+            <a:endParaRPr lang="en-US" dirty="0"/>
+          </a:p>
+        </p:txBody>
+      </p:sp>
+      <p:pic>
+        <p:nvPicPr>
+          <p:cNvPr id="5" name="Picture 4">
+            <a:extLst>
+              <a:ext uri="{FF2B5EF4-FFF2-40B4-BE49-F238E27FC236}">
+                <a16:creationId xmlns:a16="http://schemas.microsoft.com/office/drawing/2014/main" id="{A9F65F3B-5B1A-2442-8D3D-565775C1F912}"/>
+              </a:ext>
+            </a:extLst>
+          </p:cNvPr>
+          <p:cNvPicPr>
+            <a:picLocks noChangeAspect="1"/>
+          </p:cNvPicPr>
+          <p:nvPr/>
+        </p:nvPicPr>
+        <p:blipFill>
+          <a:blip r:embed="rId2"/>
+          <a:stretch>
+            <a:fillRect/>
+          </a:stretch>
+        </p:blipFill>
+        <p:spPr>
+          <a:xfrm>
+            <a:off x="2842055" y="-181705"/>
+            <a:ext cx="5875292" cy="8312451"/>
+          </a:xfrm>
+          <a:prstGeom prst="rect">
+            <a:avLst/>
+          </a:prstGeom>
+        </p:spPr>
+      </p:pic>
+    </p:spTree>
+    <p:extLst>
+      <p:ext uri="{BB962C8B-B14F-4D97-AF65-F5344CB8AC3E}">
+        <p14:creationId xmlns:p14="http://schemas.microsoft.com/office/powerpoint/2010/main" val="2851971659"/>
+      </p:ext>
+    </p:extLst>
+  </p:cSld>
+  <p:clrMapOvr>
+    <a:masterClrMapping/>
+  </p:clrMapOvr>
+</p:sld>
+</file>
+
+<file path=ppt/slides/slide11.xml><?xml version="1.0" encoding="utf-8"?>
+<p:sld xmlns:a="http://schemas.openxmlformats.org/drawingml/2006/main" xmlns:r="http://schemas.openxmlformats.org/officeDocument/2006/relationships" xmlns:p="http://schemas.openxmlformats.org/presentationml/2006/main">
+  <p:cSld>
+    <p:spTree>
+      <p:nvGrpSpPr>
+        <p:cNvPr id="1" name=""/>
+        <p:cNvGrpSpPr/>
+        <p:nvPr/>
+      </p:nvGrpSpPr>
+      <p:grpSpPr>
+        <a:xfrm>
+          <a:off x="0" y="0"/>
+          <a:ext cx="0" cy="0"/>
+          <a:chOff x="0" y="0"/>
+          <a:chExt cx="0" cy="0"/>
+        </a:xfrm>
+      </p:grpSpPr>
+      <p:sp>
+        <p:nvSpPr>
+          <p:cNvPr id="2" name="Title 1"/>
+          <p:cNvSpPr>
+            <a:spLocks noGrp="1"/>
+          </p:cNvSpPr>
+          <p:nvPr>
+            <p:ph type="title"/>
+          </p:nvPr>
+        </p:nvSpPr>
+        <p:spPr/>
+        <p:txBody>
+          <a:bodyPr/>
+          <a:lstStyle/>
+          <a:p>
+            <a:r>
+              <a:rPr lang="en-US" dirty="0"/>
+              <a:t>Milestone 2</a:t>
+            </a:r>
+          </a:p>
+        </p:txBody>
+      </p:sp>
+      <p:sp>
+        <p:nvSpPr>
+          <p:cNvPr id="3" name="Text Placeholder 2"/>
+          <p:cNvSpPr>
+            <a:spLocks noGrp="1"/>
+          </p:cNvSpPr>
+          <p:nvPr>
+            <p:ph type="body" idx="1"/>
+          </p:nvPr>
+        </p:nvSpPr>
+        <p:spPr/>
+        <p:txBody>
+          <a:bodyPr/>
+          <a:lstStyle/>
+          <a:p>
+            <a:r>
+              <a:rPr lang="en-US" dirty="0"/>
+              <a:t>VPCs with a little help from our friends?</a:t>
+            </a:r>
+          </a:p>
+        </p:txBody>
+      </p:sp>
+      <p:sp>
+        <p:nvSpPr>
+          <p:cNvPr id="4" name="Footer Placeholder 3"/>
+          <p:cNvSpPr>
+            <a:spLocks noGrp="1"/>
+          </p:cNvSpPr>
+          <p:nvPr>
+            <p:ph type="ftr" sz="quarter" idx="11"/>
+          </p:nvPr>
+        </p:nvSpPr>
+        <p:spPr/>
+        <p:txBody>
+          <a:bodyPr/>
+          <a:lstStyle/>
+          <a:p>
+            <a:r>
+              <a:rPr lang="en-US"/>
+              <a:t>@redmind</a:t>
+            </a:r>
+            <a:endParaRPr lang="en-US" dirty="0"/>
+          </a:p>
+        </p:txBody>
+      </p:sp>
+    </p:spTree>
+    <p:extLst>
+      <p:ext uri="{BB962C8B-B14F-4D97-AF65-F5344CB8AC3E}">
+        <p14:creationId xmlns:p14="http://schemas.microsoft.com/office/powerpoint/2010/main" val="2846704752"/>
+      </p:ext>
+    </p:extLst>
+  </p:cSld>
+  <p:clrMapOvr>
+    <a:masterClrMapping/>
+  </p:clrMapOvr>
+</p:sld>
+</file>
+
+<file path=ppt/slides/slide12.xml><?xml version="1.0" encoding="utf-8"?>
+<p:sld xmlns:a="http://schemas.openxmlformats.org/drawingml/2006/main" xmlns:r="http://schemas.openxmlformats.org/officeDocument/2006/relationships" xmlns:p="http://schemas.openxmlformats.org/presentationml/2006/main">
+  <p:cSld>
+    <p:spTree>
+      <p:nvGrpSpPr>
+        <p:cNvPr id="1" name=""/>
+        <p:cNvGrpSpPr/>
+        <p:nvPr/>
+      </p:nvGrpSpPr>
+      <p:grpSpPr>
+        <a:xfrm>
+          <a:off x="0" y="0"/>
+          <a:ext cx="0" cy="0"/>
+          <a:chOff x="0" y="0"/>
+          <a:chExt cx="0" cy="0"/>
+        </a:xfrm>
+      </p:grpSpPr>
+      <p:sp>
+        <p:nvSpPr>
+          <p:cNvPr id="2" name="Footer Placeholder 1">
+            <a:extLst>
+              <a:ext uri="{FF2B5EF4-FFF2-40B4-BE49-F238E27FC236}">
+                <a16:creationId xmlns:a16="http://schemas.microsoft.com/office/drawing/2014/main" id="{2A8FD6C5-1933-A54A-A077-ED78B2B05F2E}"/>
+              </a:ext>
+            </a:extLst>
+          </p:cNvPr>
+          <p:cNvSpPr>
+            <a:spLocks noGrp="1"/>
+          </p:cNvSpPr>
+          <p:nvPr>
+            <p:ph type="ftr" sz="quarter" idx="11"/>
+          </p:nvPr>
+        </p:nvSpPr>
+        <p:spPr/>
+        <p:txBody>
+          <a:bodyPr/>
+          <a:lstStyle/>
+          <a:p>
+            <a:r>
+              <a:rPr lang="en-US"/>
+              <a:t>@redmind</a:t>
+            </a:r>
+            <a:endParaRPr lang="en-US" dirty="0"/>
+          </a:p>
+        </p:txBody>
+      </p:sp>
+      <p:pic>
+        <p:nvPicPr>
+          <p:cNvPr id="4" name="Picture 3">
+            <a:extLst>
+              <a:ext uri="{FF2B5EF4-FFF2-40B4-BE49-F238E27FC236}">
+                <a16:creationId xmlns:a16="http://schemas.microsoft.com/office/drawing/2014/main" id="{A7C2721B-8D5E-7E4C-AB4B-042803F00F1A}"/>
+              </a:ext>
+            </a:extLst>
+          </p:cNvPr>
+          <p:cNvPicPr>
+            <a:picLocks noChangeAspect="1"/>
+          </p:cNvPicPr>
+          <p:nvPr/>
+        </p:nvPicPr>
+        <p:blipFill>
+          <a:blip r:embed="rId2"/>
+          <a:stretch>
+            <a:fillRect/>
+          </a:stretch>
+        </p:blipFill>
+        <p:spPr>
+          <a:xfrm>
+            <a:off x="2916195" y="-252185"/>
+            <a:ext cx="5733535" cy="8111891"/>
+          </a:xfrm>
+          <a:prstGeom prst="rect">
+            <a:avLst/>
+          </a:prstGeom>
+        </p:spPr>
+      </p:pic>
+    </p:spTree>
+    <p:extLst>
+      <p:ext uri="{BB962C8B-B14F-4D97-AF65-F5344CB8AC3E}">
+        <p14:creationId xmlns:p14="http://schemas.microsoft.com/office/powerpoint/2010/main" val="1654026921"/>
+      </p:ext>
+    </p:extLst>
+  </p:cSld>
+  <p:clrMapOvr>
+    <a:masterClrMapping/>
+  </p:clrMapOvr>
+</p:sld>
+</file>
+
+<file path=ppt/slides/slide13.xml><?xml version="1.0" encoding="utf-8"?>
+<p:sld xmlns:a="http://schemas.openxmlformats.org/drawingml/2006/main" xmlns:r="http://schemas.openxmlformats.org/officeDocument/2006/relationships" xmlns:p="http://schemas.openxmlformats.org/presentationml/2006/main">
+  <p:cSld>
+    <p:spTree>
+      <p:nvGrpSpPr>
+        <p:cNvPr id="1" name=""/>
+        <p:cNvGrpSpPr/>
+        <p:nvPr/>
+      </p:nvGrpSpPr>
+      <p:grpSpPr>
+        <a:xfrm>
+          <a:off x="0" y="0"/>
+          <a:ext cx="0" cy="0"/>
+          <a:chOff x="0" y="0"/>
+          <a:chExt cx="0" cy="0"/>
+        </a:xfrm>
+      </p:grpSpPr>
+      <p:sp>
+        <p:nvSpPr>
+          <p:cNvPr id="2" name="Title 1"/>
+          <p:cNvSpPr>
+            <a:spLocks noGrp="1"/>
+          </p:cNvSpPr>
+          <p:nvPr>
+            <p:ph type="title"/>
+          </p:nvPr>
+        </p:nvSpPr>
+        <p:spPr/>
+        <p:txBody>
+          <a:bodyPr/>
+          <a:lstStyle/>
+          <a:p>
+            <a:r>
+              <a:rPr lang="en-US" dirty="0"/>
+              <a:t>Milestone 3</a:t>
+            </a:r>
+          </a:p>
+        </p:txBody>
+      </p:sp>
+      <p:sp>
+        <p:nvSpPr>
+          <p:cNvPr id="3" name="Text Placeholder 2"/>
+          <p:cNvSpPr>
+            <a:spLocks noGrp="1"/>
+          </p:cNvSpPr>
+          <p:nvPr>
+            <p:ph type="body" idx="1"/>
+          </p:nvPr>
+        </p:nvSpPr>
+        <p:spPr/>
+        <p:txBody>
+          <a:bodyPr/>
+          <a:lstStyle/>
+          <a:p>
+            <a:r>
+              <a:rPr lang="en-US" dirty="0" err="1"/>
+              <a:t>Scalin</a:t>
+            </a:r>
+            <a:r>
+              <a:rPr lang="en-US" dirty="0"/>
+              <a:t>’ up, and </a:t>
+            </a:r>
+            <a:r>
+              <a:rPr lang="en-US" dirty="0" err="1"/>
+              <a:t>scalin</a:t>
+            </a:r>
+            <a:r>
+              <a:rPr lang="en-US" dirty="0"/>
+              <a:t>’ out</a:t>
+            </a:r>
+          </a:p>
+        </p:txBody>
+      </p:sp>
+      <p:sp>
+        <p:nvSpPr>
+          <p:cNvPr id="4" name="Footer Placeholder 3"/>
+          <p:cNvSpPr>
+            <a:spLocks noGrp="1"/>
+          </p:cNvSpPr>
+          <p:nvPr>
+            <p:ph type="ftr" sz="quarter" idx="11"/>
+          </p:nvPr>
+        </p:nvSpPr>
+        <p:spPr/>
+        <p:txBody>
+          <a:bodyPr/>
+          <a:lstStyle/>
+          <a:p>
+            <a:r>
+              <a:rPr lang="en-US"/>
+              <a:t>@redmind</a:t>
+            </a:r>
+            <a:endParaRPr lang="en-US" dirty="0"/>
+          </a:p>
+        </p:txBody>
+      </p:sp>
+    </p:spTree>
+    <p:extLst>
+      <p:ext uri="{BB962C8B-B14F-4D97-AF65-F5344CB8AC3E}">
+        <p14:creationId xmlns:p14="http://schemas.microsoft.com/office/powerpoint/2010/main" val="2981062416"/>
+      </p:ext>
+    </p:extLst>
+  </p:cSld>
+  <p:clrMapOvr>
+    <a:masterClrMapping/>
+  </p:clrMapOvr>
+</p:sld>
+</file>
+
+<file path=ppt/slides/slide14.xml><?xml version="1.0" encoding="utf-8"?>
+<p:sld xmlns:a="http://schemas.openxmlformats.org/drawingml/2006/main" xmlns:r="http://schemas.openxmlformats.org/officeDocument/2006/relationships" xmlns:p="http://schemas.openxmlformats.org/presentationml/2006/main">
+  <p:cSld>
+    <p:spTree>
+      <p:nvGrpSpPr>
+        <p:cNvPr id="1" name=""/>
+        <p:cNvGrpSpPr/>
+        <p:nvPr/>
+      </p:nvGrpSpPr>
+      <p:grpSpPr>
+        <a:xfrm>
+          <a:off x="0" y="0"/>
+          <a:ext cx="0" cy="0"/>
+          <a:chOff x="0" y="0"/>
+          <a:chExt cx="0" cy="0"/>
+        </a:xfrm>
+      </p:grpSpPr>
+      <p:sp>
+        <p:nvSpPr>
+          <p:cNvPr id="2" name="Footer Placeholder 1">
+            <a:extLst>
+              <a:ext uri="{FF2B5EF4-FFF2-40B4-BE49-F238E27FC236}">
+                <a16:creationId xmlns:a16="http://schemas.microsoft.com/office/drawing/2014/main" id="{2A8FD6C5-1933-A54A-A077-ED78B2B05F2E}"/>
+              </a:ext>
+            </a:extLst>
+          </p:cNvPr>
+          <p:cNvSpPr>
+            <a:spLocks noGrp="1"/>
+          </p:cNvSpPr>
+          <p:nvPr>
+            <p:ph type="ftr" sz="quarter" idx="11"/>
+          </p:nvPr>
+        </p:nvSpPr>
+        <p:spPr/>
+        <p:txBody>
+          <a:bodyPr/>
+          <a:lstStyle/>
+          <a:p>
+            <a:r>
+              <a:rPr lang="en-US"/>
+              <a:t>@redmind</a:t>
+            </a:r>
+            <a:endParaRPr lang="en-US" dirty="0"/>
+          </a:p>
+        </p:txBody>
+      </p:sp>
+      <p:pic>
+        <p:nvPicPr>
+          <p:cNvPr id="4" name="Picture 3">
+            <a:extLst>
+              <a:ext uri="{FF2B5EF4-FFF2-40B4-BE49-F238E27FC236}">
+                <a16:creationId xmlns:a16="http://schemas.microsoft.com/office/drawing/2014/main" id="{A7C2721B-8D5E-7E4C-AB4B-042803F00F1A}"/>
+              </a:ext>
+            </a:extLst>
+          </p:cNvPr>
+          <p:cNvPicPr>
+            <a:picLocks noChangeAspect="1"/>
+          </p:cNvPicPr>
+          <p:nvPr/>
+        </p:nvPicPr>
+        <p:blipFill>
+          <a:blip r:embed="rId2"/>
+          <a:stretch>
+            <a:fillRect/>
+          </a:stretch>
+        </p:blipFill>
+        <p:spPr>
+          <a:xfrm>
+            <a:off x="2891481" y="-103904"/>
+            <a:ext cx="5733535" cy="8111890"/>
+          </a:xfrm>
+          <a:prstGeom prst="rect">
+            <a:avLst/>
+          </a:prstGeom>
+        </p:spPr>
+      </p:pic>
+    </p:spTree>
+    <p:extLst>
+      <p:ext uri="{BB962C8B-B14F-4D97-AF65-F5344CB8AC3E}">
+        <p14:creationId xmlns:p14="http://schemas.microsoft.com/office/powerpoint/2010/main" val="2289641873"/>
+      </p:ext>
+    </p:extLst>
+  </p:cSld>
+  <p:clrMapOvr>
+    <a:masterClrMapping/>
+  </p:clrMapOvr>
+</p:sld>
+</file>
+
+<file path=ppt/slides/slide15.xml><?xml version="1.0" encoding="utf-8"?>
+<p:sld xmlns:a="http://schemas.openxmlformats.org/drawingml/2006/main" xmlns:r="http://schemas.openxmlformats.org/officeDocument/2006/relationships" xmlns:p="http://schemas.openxmlformats.org/presentationml/2006/main">
+  <p:cSld>
+    <p:spTree>
+      <p:nvGrpSpPr>
+        <p:cNvPr id="1" name=""/>
+        <p:cNvGrpSpPr/>
+        <p:nvPr/>
+      </p:nvGrpSpPr>
+      <p:grpSpPr>
+        <a:xfrm>
+          <a:off x="0" y="0"/>
+          <a:ext cx="0" cy="0"/>
+          <a:chOff x="0" y="0"/>
+          <a:chExt cx="0" cy="0"/>
+        </a:xfrm>
+      </p:grpSpPr>
+      <p:sp>
+        <p:nvSpPr>
+          <p:cNvPr id="2" name="Title 1"/>
+          <p:cNvSpPr>
+            <a:spLocks noGrp="1"/>
+          </p:cNvSpPr>
+          <p:nvPr>
+            <p:ph type="title"/>
+          </p:nvPr>
+        </p:nvSpPr>
+        <p:spPr/>
+        <p:txBody>
+          <a:bodyPr/>
+          <a:lstStyle/>
+          <a:p>
+            <a:r>
+              <a:rPr lang="en-US" dirty="0"/>
+              <a:t>Milestone 4</a:t>
+            </a:r>
+          </a:p>
+        </p:txBody>
+      </p:sp>
+      <p:sp>
+        <p:nvSpPr>
+          <p:cNvPr id="3" name="Text Placeholder 2"/>
+          <p:cNvSpPr>
+            <a:spLocks noGrp="1"/>
+          </p:cNvSpPr>
+          <p:nvPr>
+            <p:ph type="body" idx="1"/>
+          </p:nvPr>
+        </p:nvSpPr>
+        <p:spPr/>
+        <p:txBody>
+          <a:bodyPr/>
+          <a:lstStyle/>
+          <a:p>
+            <a:r>
+              <a:rPr lang="en-US" dirty="0"/>
+              <a:t>#goals?</a:t>
+            </a:r>
+          </a:p>
+        </p:txBody>
+      </p:sp>
+      <p:sp>
+        <p:nvSpPr>
+          <p:cNvPr id="4" name="Footer Placeholder 3"/>
+          <p:cNvSpPr>
+            <a:spLocks noGrp="1"/>
+          </p:cNvSpPr>
+          <p:nvPr>
+            <p:ph type="ftr" sz="quarter" idx="11"/>
+          </p:nvPr>
+        </p:nvSpPr>
+        <p:spPr/>
+        <p:txBody>
+          <a:bodyPr/>
+          <a:lstStyle/>
+          <a:p>
+            <a:r>
+              <a:rPr lang="en-US"/>
+              <a:t>@redmind</a:t>
+            </a:r>
+            <a:endParaRPr lang="en-US" dirty="0"/>
+          </a:p>
+        </p:txBody>
+      </p:sp>
+    </p:spTree>
+    <p:extLst>
+      <p:ext uri="{BB962C8B-B14F-4D97-AF65-F5344CB8AC3E}">
+        <p14:creationId xmlns:p14="http://schemas.microsoft.com/office/powerpoint/2010/main" val="3194238907"/>
+      </p:ext>
+    </p:extLst>
+  </p:cSld>
+  <p:clrMapOvr>
+    <a:masterClrMapping/>
+  </p:clrMapOvr>
+</p:sld>
+</file>
+
+<file path=ppt/slides/slide16.xml><?xml version="1.0" encoding="utf-8"?>
+<p:sld xmlns:a="http://schemas.openxmlformats.org/drawingml/2006/main" xmlns:r="http://schemas.openxmlformats.org/officeDocument/2006/relationships" xmlns:p="http://schemas.openxmlformats.org/presentationml/2006/main">
+  <p:cSld>
+    <p:spTree>
+      <p:nvGrpSpPr>
+        <p:cNvPr id="1" name=""/>
+        <p:cNvGrpSpPr/>
+        <p:nvPr/>
+      </p:nvGrpSpPr>
+      <p:grpSpPr>
+        <a:xfrm>
+          <a:off x="0" y="0"/>
+          <a:ext cx="0" cy="0"/>
+          <a:chOff x="0" y="0"/>
+          <a:chExt cx="0" cy="0"/>
+        </a:xfrm>
+      </p:grpSpPr>
+      <p:sp>
+        <p:nvSpPr>
           <p:cNvPr id="2" name="Footer Placeholder 1">
             <a:extLst>
               <a:ext uri="{FF2B5EF4-FFF2-40B4-BE49-F238E27FC236}">
@@ -4314,7 +4890,7 @@
 </p:sld>
 </file>
 
-<file path=ppt/slides/slide11.xml><?xml version="1.0" encoding="utf-8"?>
+<file path=ppt/slides/slide17.xml><?xml version="1.0" encoding="utf-8"?>
 <p:sld xmlns:a="http://schemas.openxmlformats.org/drawingml/2006/main" xmlns:r="http://schemas.openxmlformats.org/officeDocument/2006/relationships" xmlns:p="http://schemas.openxmlformats.org/presentationml/2006/main">
   <p:cSld>
     <p:spTree>
@@ -4479,7 +5055,7 @@
 </p:sld>
 </file>
 
-<file path=ppt/slides/slide12.xml><?xml version="1.0" encoding="utf-8"?>
+<file path=ppt/slides/slide18.xml><?xml version="1.0" encoding="utf-8"?>
 <p:sld xmlns:a="http://schemas.openxmlformats.org/drawingml/2006/main" xmlns:r="http://schemas.openxmlformats.org/officeDocument/2006/relationships" xmlns:p="http://schemas.openxmlformats.org/presentationml/2006/main">
   <p:cSld>
     <p:spTree>
@@ -4642,7 +5218,10 @@
               <a:rPr lang="en-US" dirty="0" err="1"/>
               <a:t>jharley</a:t>
             </a:r>
-            <a:endParaRPr lang="en-US" dirty="0"/>
+            <a:r>
+              <a:rPr lang="en-US" dirty="0"/>
+              <a:t>/terraform-intro</a:t>
+            </a:r>
           </a:p>
         </p:txBody>
       </p:sp>
@@ -5698,10 +6277,10 @@
       </p:grpSpPr>
       <p:sp>
         <p:nvSpPr>
-          <p:cNvPr id="3" name="Footer Placeholder 2">
+          <p:cNvPr id="2" name="Footer Placeholder 1">
             <a:extLst>
               <a:ext uri="{FF2B5EF4-FFF2-40B4-BE49-F238E27FC236}">
-                <a16:creationId xmlns:a16="http://schemas.microsoft.com/office/drawing/2014/main" id="{879FFCEB-AB73-A544-960D-0FB6B310C87A}"/>
+                <a16:creationId xmlns:a16="http://schemas.microsoft.com/office/drawing/2014/main" id="{2A8FD6C5-1933-A54A-A077-ED78B2B05F2E}"/>
               </a:ext>
             </a:extLst>
           </p:cNvPr>
@@ -5727,10 +6306,10 @@
       </p:sp>
       <p:pic>
         <p:nvPicPr>
-          <p:cNvPr id="5" name="Picture 4">
+          <p:cNvPr id="4" name="Picture 3">
             <a:extLst>
               <a:ext uri="{FF2B5EF4-FFF2-40B4-BE49-F238E27FC236}">
-                <a16:creationId xmlns:a16="http://schemas.microsoft.com/office/drawing/2014/main" id="{A9F65F3B-5B1A-2442-8D3D-565775C1F912}"/>
+                <a16:creationId xmlns:a16="http://schemas.microsoft.com/office/drawing/2014/main" id="{A7C2721B-8D5E-7E4C-AB4B-042803F00F1A}"/>
               </a:ext>
             </a:extLst>
           </p:cNvPr>
@@ -5747,8 +6326,8 @@
         </p:blipFill>
         <p:spPr>
           <a:xfrm>
-            <a:off x="2842055" y="-181705"/>
-            <a:ext cx="5875292" cy="8312451"/>
+            <a:off x="2903838" y="-54476"/>
+            <a:ext cx="5733535" cy="8111890"/>
           </a:xfrm>
           <a:prstGeom prst="rect">
             <a:avLst/>
@@ -5758,7 +6337,7 @@
     </p:spTree>
     <p:extLst>
       <p:ext uri="{BB962C8B-B14F-4D97-AF65-F5344CB8AC3E}">
-        <p14:creationId xmlns:p14="http://schemas.microsoft.com/office/powerpoint/2010/main" val="2851971659"/>
+        <p14:creationId xmlns:p14="http://schemas.microsoft.com/office/powerpoint/2010/main" val="2354523824"/>
       </p:ext>
     </p:extLst>
   </p:cSld>
@@ -5787,13 +6366,55 @@
       </p:grpSpPr>
       <p:sp>
         <p:nvSpPr>
-          <p:cNvPr id="2" name="Footer Placeholder 1">
-            <a:extLst>
-              <a:ext uri="{FF2B5EF4-FFF2-40B4-BE49-F238E27FC236}">
-                <a16:creationId xmlns:a16="http://schemas.microsoft.com/office/drawing/2014/main" id="{2A8FD6C5-1933-A54A-A077-ED78B2B05F2E}"/>
-              </a:ext>
-            </a:extLst>
-          </p:cNvPr>
+          <p:cNvPr id="2" name="Title 1"/>
+          <p:cNvSpPr>
+            <a:spLocks noGrp="1"/>
+          </p:cNvSpPr>
+          <p:nvPr>
+            <p:ph type="title"/>
+          </p:nvPr>
+        </p:nvSpPr>
+        <p:spPr/>
+        <p:txBody>
+          <a:bodyPr/>
+          <a:lstStyle/>
+          <a:p>
+            <a:r>
+              <a:rPr lang="en-US" dirty="0" err="1"/>
+              <a:t>Okayokay</a:t>
+            </a:r>
+            <a:r>
+              <a:rPr lang="en-US" dirty="0"/>
+              <a:t>… but</a:t>
+            </a:r>
+          </a:p>
+        </p:txBody>
+      </p:sp>
+      <p:sp>
+        <p:nvSpPr>
+          <p:cNvPr id="3" name="Text Placeholder 2"/>
+          <p:cNvSpPr>
+            <a:spLocks noGrp="1"/>
+          </p:cNvSpPr>
+          <p:nvPr>
+            <p:ph type="body" idx="1"/>
+          </p:nvPr>
+        </p:nvSpPr>
+        <p:spPr/>
+        <p:txBody>
+          <a:bodyPr/>
+          <a:lstStyle/>
+          <a:p>
+            <a:r>
+              <a:rPr lang="en-US" dirty="0"/>
+              <a:t>How?</a:t>
+            </a:r>
+          </a:p>
+        </p:txBody>
+      </p:sp>
+      <p:sp>
+        <p:nvSpPr>
+          <p:cNvPr id="4" name="Footer Placeholder 3"/>
           <p:cNvSpPr>
             <a:spLocks noGrp="1"/>
           </p:cNvSpPr>
@@ -5814,40 +6435,10 @@
           </a:p>
         </p:txBody>
       </p:sp>
-      <p:pic>
-        <p:nvPicPr>
-          <p:cNvPr id="4" name="Picture 3">
-            <a:extLst>
-              <a:ext uri="{FF2B5EF4-FFF2-40B4-BE49-F238E27FC236}">
-                <a16:creationId xmlns:a16="http://schemas.microsoft.com/office/drawing/2014/main" id="{A7C2721B-8D5E-7E4C-AB4B-042803F00F1A}"/>
-              </a:ext>
-            </a:extLst>
-          </p:cNvPr>
-          <p:cNvPicPr>
-            <a:picLocks noChangeAspect="1"/>
-          </p:cNvPicPr>
-          <p:nvPr/>
-        </p:nvPicPr>
-        <p:blipFill>
-          <a:blip r:embed="rId2"/>
-          <a:stretch>
-            <a:fillRect/>
-          </a:stretch>
-        </p:blipFill>
-        <p:spPr>
-          <a:xfrm>
-            <a:off x="2916195" y="-252185"/>
-            <a:ext cx="5733535" cy="8111891"/>
-          </a:xfrm>
-          <a:prstGeom prst="rect">
-            <a:avLst/>
-          </a:prstGeom>
-        </p:spPr>
-      </p:pic>
     </p:spTree>
     <p:extLst>
       <p:ext uri="{BB962C8B-B14F-4D97-AF65-F5344CB8AC3E}">
-        <p14:creationId xmlns:p14="http://schemas.microsoft.com/office/powerpoint/2010/main" val="1654026921"/>
+        <p14:creationId xmlns:p14="http://schemas.microsoft.com/office/powerpoint/2010/main" val="2343073412"/>
       </p:ext>
     </p:extLst>
   </p:cSld>
@@ -5876,13 +6467,51 @@
       </p:grpSpPr>
       <p:sp>
         <p:nvSpPr>
-          <p:cNvPr id="2" name="Footer Placeholder 1">
-            <a:extLst>
-              <a:ext uri="{FF2B5EF4-FFF2-40B4-BE49-F238E27FC236}">
-                <a16:creationId xmlns:a16="http://schemas.microsoft.com/office/drawing/2014/main" id="{2A8FD6C5-1933-A54A-A077-ED78B2B05F2E}"/>
-              </a:ext>
-            </a:extLst>
-          </p:cNvPr>
+          <p:cNvPr id="2" name="Title 1"/>
+          <p:cNvSpPr>
+            <a:spLocks noGrp="1"/>
+          </p:cNvSpPr>
+          <p:nvPr>
+            <p:ph type="title"/>
+          </p:nvPr>
+        </p:nvSpPr>
+        <p:spPr/>
+        <p:txBody>
+          <a:bodyPr/>
+          <a:lstStyle/>
+          <a:p>
+            <a:r>
+              <a:rPr lang="en-US" dirty="0"/>
+              <a:t>Milestone 1</a:t>
+            </a:r>
+          </a:p>
+        </p:txBody>
+      </p:sp>
+      <p:sp>
+        <p:nvSpPr>
+          <p:cNvPr id="3" name="Text Placeholder 2"/>
+          <p:cNvSpPr>
+            <a:spLocks noGrp="1"/>
+          </p:cNvSpPr>
+          <p:nvPr>
+            <p:ph type="body" idx="1"/>
+          </p:nvPr>
+        </p:nvSpPr>
+        <p:spPr/>
+        <p:txBody>
+          <a:bodyPr/>
+          <a:lstStyle/>
+          <a:p>
+            <a:r>
+              <a:rPr lang="en-US" dirty="0"/>
+              <a:t>Flag on the Moon</a:t>
+            </a:r>
+          </a:p>
+        </p:txBody>
+      </p:sp>
+      <p:sp>
+        <p:nvSpPr>
+          <p:cNvPr id="4" name="Footer Placeholder 3"/>
           <p:cNvSpPr>
             <a:spLocks noGrp="1"/>
           </p:cNvSpPr>
@@ -5903,40 +6532,10 @@
           </a:p>
         </p:txBody>
       </p:sp>
-      <p:pic>
-        <p:nvPicPr>
-          <p:cNvPr id="4" name="Picture 3">
-            <a:extLst>
-              <a:ext uri="{FF2B5EF4-FFF2-40B4-BE49-F238E27FC236}">
-                <a16:creationId xmlns:a16="http://schemas.microsoft.com/office/drawing/2014/main" id="{A7C2721B-8D5E-7E4C-AB4B-042803F00F1A}"/>
-              </a:ext>
-            </a:extLst>
-          </p:cNvPr>
-          <p:cNvPicPr>
-            <a:picLocks noChangeAspect="1"/>
-          </p:cNvPicPr>
-          <p:nvPr/>
-        </p:nvPicPr>
-        <p:blipFill>
-          <a:blip r:embed="rId2"/>
-          <a:stretch>
-            <a:fillRect/>
-          </a:stretch>
-        </p:blipFill>
-        <p:spPr>
-          <a:xfrm>
-            <a:off x="2891481" y="-103904"/>
-            <a:ext cx="5733535" cy="8111890"/>
-          </a:xfrm>
-          <a:prstGeom prst="rect">
-            <a:avLst/>
-          </a:prstGeom>
-        </p:spPr>
-      </p:pic>
     </p:spTree>
     <p:extLst>
       <p:ext uri="{BB962C8B-B14F-4D97-AF65-F5344CB8AC3E}">
-        <p14:creationId xmlns:p14="http://schemas.microsoft.com/office/powerpoint/2010/main" val="2289641873"/>
+        <p14:creationId xmlns:p14="http://schemas.microsoft.com/office/powerpoint/2010/main" val="3432810275"/>
       </p:ext>
     </p:extLst>
   </p:cSld>

</xml_diff>

<commit_message>
Moar slide tweaks #sorrynotsorry
</commit_message>
<xml_diff>
--- a/slides/Intro to Terraform.pptx
+++ b/slides/Intro to Terraform.pptx
@@ -5293,10 +5293,6 @@
               <a:rPr lang="en-US" dirty="0" err="1"/>
               <a:t>jharley</a:t>
             </a:r>
-            <a:r>
-              <a:rPr lang="en-US" dirty="0"/>
-              <a:t>/</a:t>
-            </a:r>
             <a:br>
               <a:rPr lang="en-US" dirty="0"/>
             </a:br>
@@ -5596,6 +5592,13 @@
             </a:r>
           </a:p>
           <a:p>
+            <a:pPr lvl="2"/>
+            <a:r>
+              <a:rPr lang="en-US" dirty="0"/>
+              <a:t>mixing vendors’ solutions is possible with the same workflow and tooling</a:t>
+            </a:r>
+          </a:p>
+          <a:p>
             <a:r>
               <a:rPr lang="en-US" dirty="0"/>
               <a:t>YAML and JSON… are often frustrating</a:t>
@@ -5643,6 +5646,310 @@
   <p:clrMapOvr>
     <a:masterClrMapping/>
   </p:clrMapOvr>
+  <p:timing>
+    <p:tnLst>
+      <p:par>
+        <p:cTn id="1" dur="indefinite" restart="never" nodeType="tmRoot">
+          <p:childTnLst>
+            <p:seq concurrent="1" nextAc="seek">
+              <p:cTn id="2" dur="indefinite" nodeType="mainSeq">
+                <p:childTnLst>
+                  <p:par>
+                    <p:cTn id="3" fill="hold">
+                      <p:stCondLst>
+                        <p:cond delay="indefinite"/>
+                      </p:stCondLst>
+                      <p:childTnLst>
+                        <p:par>
+                          <p:cTn id="4" fill="hold">
+                            <p:stCondLst>
+                              <p:cond delay="0"/>
+                            </p:stCondLst>
+                            <p:childTnLst>
+                              <p:par>
+                                <p:cTn id="5" presetID="1" presetClass="entr" presetSubtype="0" fill="hold" grpId="0" nodeType="clickEffect">
+                                  <p:stCondLst>
+                                    <p:cond delay="0"/>
+                                  </p:stCondLst>
+                                  <p:childTnLst>
+                                    <p:set>
+                                      <p:cBhvr>
+                                        <p:cTn id="6" dur="1" fill="hold">
+                                          <p:stCondLst>
+                                            <p:cond delay="0"/>
+                                          </p:stCondLst>
+                                        </p:cTn>
+                                        <p:tgtEl>
+                                          <p:spTgt spid="6">
+                                            <p:txEl>
+                                              <p:pRg st="0" end="0"/>
+                                            </p:txEl>
+                                          </p:spTgt>
+                                        </p:tgtEl>
+                                        <p:attrNameLst>
+                                          <p:attrName>style.visibility</p:attrName>
+                                        </p:attrNameLst>
+                                      </p:cBhvr>
+                                      <p:to>
+                                        <p:strVal val="visible"/>
+                                      </p:to>
+                                    </p:set>
+                                  </p:childTnLst>
+                                </p:cTn>
+                              </p:par>
+                            </p:childTnLst>
+                          </p:cTn>
+                        </p:par>
+                      </p:childTnLst>
+                    </p:cTn>
+                  </p:par>
+                  <p:par>
+                    <p:cTn id="7" fill="hold">
+                      <p:stCondLst>
+                        <p:cond delay="indefinite"/>
+                      </p:stCondLst>
+                      <p:childTnLst>
+                        <p:par>
+                          <p:cTn id="8" fill="hold">
+                            <p:stCondLst>
+                              <p:cond delay="0"/>
+                            </p:stCondLst>
+                            <p:childTnLst>
+                              <p:par>
+                                <p:cTn id="9" presetID="1" presetClass="entr" presetSubtype="0" fill="hold" grpId="0" nodeType="clickEffect">
+                                  <p:stCondLst>
+                                    <p:cond delay="0"/>
+                                  </p:stCondLst>
+                                  <p:childTnLst>
+                                    <p:set>
+                                      <p:cBhvr>
+                                        <p:cTn id="10" dur="1" fill="hold">
+                                          <p:stCondLst>
+                                            <p:cond delay="0"/>
+                                          </p:stCondLst>
+                                        </p:cTn>
+                                        <p:tgtEl>
+                                          <p:spTgt spid="6">
+                                            <p:txEl>
+                                              <p:pRg st="1" end="1"/>
+                                            </p:txEl>
+                                          </p:spTgt>
+                                        </p:tgtEl>
+                                        <p:attrNameLst>
+                                          <p:attrName>style.visibility</p:attrName>
+                                        </p:attrNameLst>
+                                      </p:cBhvr>
+                                      <p:to>
+                                        <p:strVal val="visible"/>
+                                      </p:to>
+                                    </p:set>
+                                  </p:childTnLst>
+                                </p:cTn>
+                              </p:par>
+                              <p:par>
+                                <p:cTn id="11" presetID="1" presetClass="entr" presetSubtype="0" fill="hold" grpId="0" nodeType="withEffect">
+                                  <p:stCondLst>
+                                    <p:cond delay="0"/>
+                                  </p:stCondLst>
+                                  <p:childTnLst>
+                                    <p:set>
+                                      <p:cBhvr>
+                                        <p:cTn id="12" dur="1" fill="hold">
+                                          <p:stCondLst>
+                                            <p:cond delay="0"/>
+                                          </p:stCondLst>
+                                        </p:cTn>
+                                        <p:tgtEl>
+                                          <p:spTgt spid="6">
+                                            <p:txEl>
+                                              <p:pRg st="2" end="2"/>
+                                            </p:txEl>
+                                          </p:spTgt>
+                                        </p:tgtEl>
+                                        <p:attrNameLst>
+                                          <p:attrName>style.visibility</p:attrName>
+                                        </p:attrNameLst>
+                                      </p:cBhvr>
+                                      <p:to>
+                                        <p:strVal val="visible"/>
+                                      </p:to>
+                                    </p:set>
+                                  </p:childTnLst>
+                                </p:cTn>
+                              </p:par>
+                              <p:par>
+                                <p:cTn id="13" presetID="1" presetClass="entr" presetSubtype="0" fill="hold" grpId="0" nodeType="withEffect">
+                                  <p:stCondLst>
+                                    <p:cond delay="0"/>
+                                  </p:stCondLst>
+                                  <p:childTnLst>
+                                    <p:set>
+                                      <p:cBhvr>
+                                        <p:cTn id="14" dur="1" fill="hold">
+                                          <p:stCondLst>
+                                            <p:cond delay="0"/>
+                                          </p:stCondLst>
+                                        </p:cTn>
+                                        <p:tgtEl>
+                                          <p:spTgt spid="6">
+                                            <p:txEl>
+                                              <p:pRg st="3" end="3"/>
+                                            </p:txEl>
+                                          </p:spTgt>
+                                        </p:tgtEl>
+                                        <p:attrNameLst>
+                                          <p:attrName>style.visibility</p:attrName>
+                                        </p:attrNameLst>
+                                      </p:cBhvr>
+                                      <p:to>
+                                        <p:strVal val="visible"/>
+                                      </p:to>
+                                    </p:set>
+                                  </p:childTnLst>
+                                </p:cTn>
+                              </p:par>
+                              <p:par>
+                                <p:cTn id="15" presetID="1" presetClass="entr" presetSubtype="0" fill="hold" grpId="0" nodeType="withEffect">
+                                  <p:stCondLst>
+                                    <p:cond delay="0"/>
+                                  </p:stCondLst>
+                                  <p:childTnLst>
+                                    <p:set>
+                                      <p:cBhvr>
+                                        <p:cTn id="16" dur="1" fill="hold">
+                                          <p:stCondLst>
+                                            <p:cond delay="0"/>
+                                          </p:stCondLst>
+                                        </p:cTn>
+                                        <p:tgtEl>
+                                          <p:spTgt spid="6">
+                                            <p:txEl>
+                                              <p:pRg st="4" end="4"/>
+                                            </p:txEl>
+                                          </p:spTgt>
+                                        </p:tgtEl>
+                                        <p:attrNameLst>
+                                          <p:attrName>style.visibility</p:attrName>
+                                        </p:attrNameLst>
+                                      </p:cBhvr>
+                                      <p:to>
+                                        <p:strVal val="visible"/>
+                                      </p:to>
+                                    </p:set>
+                                  </p:childTnLst>
+                                </p:cTn>
+                              </p:par>
+                            </p:childTnLst>
+                          </p:cTn>
+                        </p:par>
+                      </p:childTnLst>
+                    </p:cTn>
+                  </p:par>
+                  <p:par>
+                    <p:cTn id="17" fill="hold">
+                      <p:stCondLst>
+                        <p:cond delay="indefinite"/>
+                      </p:stCondLst>
+                      <p:childTnLst>
+                        <p:par>
+                          <p:cTn id="18" fill="hold">
+                            <p:stCondLst>
+                              <p:cond delay="0"/>
+                            </p:stCondLst>
+                            <p:childTnLst>
+                              <p:par>
+                                <p:cTn id="19" presetID="1" presetClass="entr" presetSubtype="0" fill="hold" grpId="0" nodeType="clickEffect">
+                                  <p:stCondLst>
+                                    <p:cond delay="0"/>
+                                  </p:stCondLst>
+                                  <p:childTnLst>
+                                    <p:set>
+                                      <p:cBhvr>
+                                        <p:cTn id="20" dur="1" fill="hold">
+                                          <p:stCondLst>
+                                            <p:cond delay="0"/>
+                                          </p:stCondLst>
+                                        </p:cTn>
+                                        <p:tgtEl>
+                                          <p:spTgt spid="6">
+                                            <p:txEl>
+                                              <p:pRg st="5" end="5"/>
+                                            </p:txEl>
+                                          </p:spTgt>
+                                        </p:tgtEl>
+                                        <p:attrNameLst>
+                                          <p:attrName>style.visibility</p:attrName>
+                                        </p:attrNameLst>
+                                      </p:cBhvr>
+                                      <p:to>
+                                        <p:strVal val="visible"/>
+                                      </p:to>
+                                    </p:set>
+                                  </p:childTnLst>
+                                </p:cTn>
+                              </p:par>
+                              <p:par>
+                                <p:cTn id="21" presetID="1" presetClass="entr" presetSubtype="0" fill="hold" grpId="0" nodeType="withEffect">
+                                  <p:stCondLst>
+                                    <p:cond delay="0"/>
+                                  </p:stCondLst>
+                                  <p:childTnLst>
+                                    <p:set>
+                                      <p:cBhvr>
+                                        <p:cTn id="22" dur="1" fill="hold">
+                                          <p:stCondLst>
+                                            <p:cond delay="0"/>
+                                          </p:stCondLst>
+                                        </p:cTn>
+                                        <p:tgtEl>
+                                          <p:spTgt spid="6">
+                                            <p:txEl>
+                                              <p:pRg st="6" end="6"/>
+                                            </p:txEl>
+                                          </p:spTgt>
+                                        </p:tgtEl>
+                                        <p:attrNameLst>
+                                          <p:attrName>style.visibility</p:attrName>
+                                        </p:attrNameLst>
+                                      </p:cBhvr>
+                                      <p:to>
+                                        <p:strVal val="visible"/>
+                                      </p:to>
+                                    </p:set>
+                                  </p:childTnLst>
+                                </p:cTn>
+                              </p:par>
+                            </p:childTnLst>
+                          </p:cTn>
+                        </p:par>
+                      </p:childTnLst>
+                    </p:cTn>
+                  </p:par>
+                </p:childTnLst>
+              </p:cTn>
+              <p:prevCondLst>
+                <p:cond evt="onPrev" delay="0">
+                  <p:tgtEl>
+                    <p:sldTgt/>
+                  </p:tgtEl>
+                </p:cond>
+              </p:prevCondLst>
+              <p:nextCondLst>
+                <p:cond evt="onNext" delay="0">
+                  <p:tgtEl>
+                    <p:sldTgt/>
+                  </p:tgtEl>
+                </p:cond>
+              </p:nextCondLst>
+            </p:seq>
+          </p:childTnLst>
+        </p:cTn>
+      </p:par>
+    </p:tnLst>
+    <p:bldLst>
+      <p:bldP spid="6" grpId="0" build="p"/>
+    </p:bldLst>
+  </p:timing>
 </p:sld>
 </file>
 
@@ -5837,6 +6144,328 @@
   <p:clrMapOvr>
     <a:masterClrMapping/>
   </p:clrMapOvr>
+  <p:timing>
+    <p:tnLst>
+      <p:par>
+        <p:cTn id="1" dur="indefinite" restart="never" nodeType="tmRoot">
+          <p:childTnLst>
+            <p:seq concurrent="1" nextAc="seek">
+              <p:cTn id="2" dur="indefinite" nodeType="mainSeq">
+                <p:childTnLst>
+                  <p:par>
+                    <p:cTn id="3" fill="hold">
+                      <p:stCondLst>
+                        <p:cond delay="indefinite"/>
+                      </p:stCondLst>
+                      <p:childTnLst>
+                        <p:par>
+                          <p:cTn id="4" fill="hold">
+                            <p:stCondLst>
+                              <p:cond delay="0"/>
+                            </p:stCondLst>
+                            <p:childTnLst>
+                              <p:par>
+                                <p:cTn id="5" presetID="1" presetClass="entr" presetSubtype="0" fill="hold" grpId="0" nodeType="clickEffect">
+                                  <p:stCondLst>
+                                    <p:cond delay="0"/>
+                                  </p:stCondLst>
+                                  <p:childTnLst>
+                                    <p:set>
+                                      <p:cBhvr>
+                                        <p:cTn id="6" dur="1" fill="hold">
+                                          <p:stCondLst>
+                                            <p:cond delay="0"/>
+                                          </p:stCondLst>
+                                        </p:cTn>
+                                        <p:tgtEl>
+                                          <p:spTgt spid="3">
+                                            <p:txEl>
+                                              <p:pRg st="0" end="0"/>
+                                            </p:txEl>
+                                          </p:spTgt>
+                                        </p:tgtEl>
+                                        <p:attrNameLst>
+                                          <p:attrName>style.visibility</p:attrName>
+                                        </p:attrNameLst>
+                                      </p:cBhvr>
+                                      <p:to>
+                                        <p:strVal val="visible"/>
+                                      </p:to>
+                                    </p:set>
+                                  </p:childTnLst>
+                                </p:cTn>
+                              </p:par>
+                              <p:par>
+                                <p:cTn id="7" presetID="1" presetClass="entr" presetSubtype="0" fill="hold" grpId="0" nodeType="withEffect">
+                                  <p:stCondLst>
+                                    <p:cond delay="0"/>
+                                  </p:stCondLst>
+                                  <p:childTnLst>
+                                    <p:set>
+                                      <p:cBhvr>
+                                        <p:cTn id="8" dur="1" fill="hold">
+                                          <p:stCondLst>
+                                            <p:cond delay="0"/>
+                                          </p:stCondLst>
+                                        </p:cTn>
+                                        <p:tgtEl>
+                                          <p:spTgt spid="3">
+                                            <p:txEl>
+                                              <p:pRg st="1" end="1"/>
+                                            </p:txEl>
+                                          </p:spTgt>
+                                        </p:tgtEl>
+                                        <p:attrNameLst>
+                                          <p:attrName>style.visibility</p:attrName>
+                                        </p:attrNameLst>
+                                      </p:cBhvr>
+                                      <p:to>
+                                        <p:strVal val="visible"/>
+                                      </p:to>
+                                    </p:set>
+                                  </p:childTnLst>
+                                </p:cTn>
+                              </p:par>
+                            </p:childTnLst>
+                          </p:cTn>
+                        </p:par>
+                      </p:childTnLst>
+                    </p:cTn>
+                  </p:par>
+                  <p:par>
+                    <p:cTn id="9" fill="hold">
+                      <p:stCondLst>
+                        <p:cond delay="indefinite"/>
+                      </p:stCondLst>
+                      <p:childTnLst>
+                        <p:par>
+                          <p:cTn id="10" fill="hold">
+                            <p:stCondLst>
+                              <p:cond delay="0"/>
+                            </p:stCondLst>
+                            <p:childTnLst>
+                              <p:par>
+                                <p:cTn id="11" presetID="1" presetClass="entr" presetSubtype="0" fill="hold" grpId="0" nodeType="clickEffect">
+                                  <p:stCondLst>
+                                    <p:cond delay="0"/>
+                                  </p:stCondLst>
+                                  <p:childTnLst>
+                                    <p:set>
+                                      <p:cBhvr>
+                                        <p:cTn id="12" dur="1" fill="hold">
+                                          <p:stCondLst>
+                                            <p:cond delay="0"/>
+                                          </p:stCondLst>
+                                        </p:cTn>
+                                        <p:tgtEl>
+                                          <p:spTgt spid="3">
+                                            <p:txEl>
+                                              <p:pRg st="2" end="2"/>
+                                            </p:txEl>
+                                          </p:spTgt>
+                                        </p:tgtEl>
+                                        <p:attrNameLst>
+                                          <p:attrName>style.visibility</p:attrName>
+                                        </p:attrNameLst>
+                                      </p:cBhvr>
+                                      <p:to>
+                                        <p:strVal val="visible"/>
+                                      </p:to>
+                                    </p:set>
+                                  </p:childTnLst>
+                                </p:cTn>
+                              </p:par>
+                              <p:par>
+                                <p:cTn id="13" presetID="1" presetClass="entr" presetSubtype="0" fill="hold" grpId="0" nodeType="withEffect">
+                                  <p:stCondLst>
+                                    <p:cond delay="0"/>
+                                  </p:stCondLst>
+                                  <p:childTnLst>
+                                    <p:set>
+                                      <p:cBhvr>
+                                        <p:cTn id="14" dur="1" fill="hold">
+                                          <p:stCondLst>
+                                            <p:cond delay="0"/>
+                                          </p:stCondLst>
+                                        </p:cTn>
+                                        <p:tgtEl>
+                                          <p:spTgt spid="3">
+                                            <p:txEl>
+                                              <p:pRg st="3" end="3"/>
+                                            </p:txEl>
+                                          </p:spTgt>
+                                        </p:tgtEl>
+                                        <p:attrNameLst>
+                                          <p:attrName>style.visibility</p:attrName>
+                                        </p:attrNameLst>
+                                      </p:cBhvr>
+                                      <p:to>
+                                        <p:strVal val="visible"/>
+                                      </p:to>
+                                    </p:set>
+                                  </p:childTnLst>
+                                </p:cTn>
+                              </p:par>
+                            </p:childTnLst>
+                          </p:cTn>
+                        </p:par>
+                      </p:childTnLst>
+                    </p:cTn>
+                  </p:par>
+                  <p:par>
+                    <p:cTn id="15" fill="hold">
+                      <p:stCondLst>
+                        <p:cond delay="indefinite"/>
+                      </p:stCondLst>
+                      <p:childTnLst>
+                        <p:par>
+                          <p:cTn id="16" fill="hold">
+                            <p:stCondLst>
+                              <p:cond delay="0"/>
+                            </p:stCondLst>
+                            <p:childTnLst>
+                              <p:par>
+                                <p:cTn id="17" presetID="1" presetClass="entr" presetSubtype="0" fill="hold" grpId="0" nodeType="clickEffect">
+                                  <p:stCondLst>
+                                    <p:cond delay="0"/>
+                                  </p:stCondLst>
+                                  <p:childTnLst>
+                                    <p:set>
+                                      <p:cBhvr>
+                                        <p:cTn id="18" dur="1" fill="hold">
+                                          <p:stCondLst>
+                                            <p:cond delay="0"/>
+                                          </p:stCondLst>
+                                        </p:cTn>
+                                        <p:tgtEl>
+                                          <p:spTgt spid="3">
+                                            <p:txEl>
+                                              <p:pRg st="4" end="4"/>
+                                            </p:txEl>
+                                          </p:spTgt>
+                                        </p:tgtEl>
+                                        <p:attrNameLst>
+                                          <p:attrName>style.visibility</p:attrName>
+                                        </p:attrNameLst>
+                                      </p:cBhvr>
+                                      <p:to>
+                                        <p:strVal val="visible"/>
+                                      </p:to>
+                                    </p:set>
+                                  </p:childTnLst>
+                                </p:cTn>
+                              </p:par>
+                            </p:childTnLst>
+                          </p:cTn>
+                        </p:par>
+                      </p:childTnLst>
+                    </p:cTn>
+                  </p:par>
+                  <p:par>
+                    <p:cTn id="19" fill="hold">
+                      <p:stCondLst>
+                        <p:cond delay="indefinite"/>
+                      </p:stCondLst>
+                      <p:childTnLst>
+                        <p:par>
+                          <p:cTn id="20" fill="hold">
+                            <p:stCondLst>
+                              <p:cond delay="0"/>
+                            </p:stCondLst>
+                            <p:childTnLst>
+                              <p:par>
+                                <p:cTn id="21" presetID="1" presetClass="entr" presetSubtype="0" fill="hold" grpId="0" nodeType="clickEffect">
+                                  <p:stCondLst>
+                                    <p:cond delay="0"/>
+                                  </p:stCondLst>
+                                  <p:childTnLst>
+                                    <p:set>
+                                      <p:cBhvr>
+                                        <p:cTn id="22" dur="1" fill="hold">
+                                          <p:stCondLst>
+                                            <p:cond delay="0"/>
+                                          </p:stCondLst>
+                                        </p:cTn>
+                                        <p:tgtEl>
+                                          <p:spTgt spid="3">
+                                            <p:txEl>
+                                              <p:pRg st="5" end="5"/>
+                                            </p:txEl>
+                                          </p:spTgt>
+                                        </p:tgtEl>
+                                        <p:attrNameLst>
+                                          <p:attrName>style.visibility</p:attrName>
+                                        </p:attrNameLst>
+                                      </p:cBhvr>
+                                      <p:to>
+                                        <p:strVal val="visible"/>
+                                      </p:to>
+                                    </p:set>
+                                  </p:childTnLst>
+                                </p:cTn>
+                              </p:par>
+                              <p:par>
+                                <p:cTn id="23" presetID="1" presetClass="entr" presetSubtype="0" fill="hold" grpId="0" nodeType="withEffect">
+                                  <p:stCondLst>
+                                    <p:cond delay="0"/>
+                                  </p:stCondLst>
+                                  <p:childTnLst>
+                                    <p:set>
+                                      <p:cBhvr>
+                                        <p:cTn id="24" dur="1" fill="hold">
+                                          <p:stCondLst>
+                                            <p:cond delay="0"/>
+                                          </p:stCondLst>
+                                        </p:cTn>
+                                        <p:tgtEl>
+                                          <p:spTgt spid="3">
+                                            <p:txEl>
+                                              <p:pRg st="6" end="6"/>
+                                            </p:txEl>
+                                          </p:spTgt>
+                                        </p:tgtEl>
+                                        <p:attrNameLst>
+                                          <p:attrName>style.visibility</p:attrName>
+                                        </p:attrNameLst>
+                                      </p:cBhvr>
+                                      <p:to>
+                                        <p:strVal val="visible"/>
+                                      </p:to>
+                                    </p:set>
+                                  </p:childTnLst>
+                                </p:cTn>
+                              </p:par>
+                            </p:childTnLst>
+                          </p:cTn>
+                        </p:par>
+                      </p:childTnLst>
+                    </p:cTn>
+                  </p:par>
+                </p:childTnLst>
+              </p:cTn>
+              <p:prevCondLst>
+                <p:cond evt="onPrev" delay="0">
+                  <p:tgtEl>
+                    <p:sldTgt/>
+                  </p:tgtEl>
+                </p:cond>
+              </p:prevCondLst>
+              <p:nextCondLst>
+                <p:cond evt="onNext" delay="0">
+                  <p:tgtEl>
+                    <p:sldTgt/>
+                  </p:tgtEl>
+                </p:cond>
+              </p:nextCondLst>
+            </p:seq>
+          </p:childTnLst>
+        </p:cTn>
+      </p:par>
+    </p:tnLst>
+    <p:bldLst>
+      <p:bldP spid="3" grpId="0" build="p"/>
+    </p:bldLst>
+  </p:timing>
 </p:sld>
 </file>
 
@@ -6543,6 +7172,88 @@
   <p:clrMapOvr>
     <a:masterClrMapping/>
   </p:clrMapOvr>
+  <p:timing>
+    <p:tnLst>
+      <p:par>
+        <p:cTn id="1" dur="indefinite" restart="never" nodeType="tmRoot">
+          <p:childTnLst>
+            <p:seq concurrent="1" nextAc="seek">
+              <p:cTn id="2" dur="indefinite" nodeType="mainSeq">
+                <p:childTnLst>
+                  <p:par>
+                    <p:cTn id="3" fill="hold">
+                      <p:stCondLst>
+                        <p:cond delay="indefinite"/>
+                      </p:stCondLst>
+                      <p:childTnLst>
+                        <p:par>
+                          <p:cTn id="4" fill="hold">
+                            <p:stCondLst>
+                              <p:cond delay="0"/>
+                            </p:stCondLst>
+                            <p:childTnLst>
+                              <p:par>
+                                <p:cTn id="5" presetID="1" presetClass="entr" presetSubtype="0" fill="hold" grpId="0" nodeType="clickEffect">
+                                  <p:stCondLst>
+                                    <p:cond delay="0"/>
+                                  </p:stCondLst>
+                                  <p:childTnLst>
+                                    <p:set>
+                                      <p:cBhvr>
+                                        <p:cTn id="6" dur="1" fill="hold">
+                                          <p:stCondLst>
+                                            <p:cond delay="0"/>
+                                          </p:stCondLst>
+                                        </p:cTn>
+                                        <p:tgtEl>
+                                          <p:spTgt spid="3">
+                                            <p:txEl>
+                                              <p:pRg st="0" end="0"/>
+                                            </p:txEl>
+                                          </p:spTgt>
+                                        </p:tgtEl>
+                                        <p:attrNameLst>
+                                          <p:attrName>style.visibility</p:attrName>
+                                        </p:attrNameLst>
+                                      </p:cBhvr>
+                                      <p:to>
+                                        <p:strVal val="visible"/>
+                                      </p:to>
+                                    </p:set>
+                                  </p:childTnLst>
+                                </p:cTn>
+                              </p:par>
+                            </p:childTnLst>
+                          </p:cTn>
+                        </p:par>
+                      </p:childTnLst>
+                    </p:cTn>
+                  </p:par>
+                </p:childTnLst>
+              </p:cTn>
+              <p:prevCondLst>
+                <p:cond evt="onPrev" delay="0">
+                  <p:tgtEl>
+                    <p:sldTgt/>
+                  </p:tgtEl>
+                </p:cond>
+              </p:prevCondLst>
+              <p:nextCondLst>
+                <p:cond evt="onNext" delay="0">
+                  <p:tgtEl>
+                    <p:sldTgt/>
+                  </p:tgtEl>
+                </p:cond>
+              </p:nextCondLst>
+            </p:seq>
+          </p:childTnLst>
+        </p:cTn>
+      </p:par>
+    </p:tnLst>
+    <p:bldLst>
+      <p:bldP spid="3" grpId="0" build="p"/>
+    </p:bldLst>
+  </p:timing>
 </p:sld>
 </file>
 

</xml_diff>